<commit_message>
Ajustes a los comentarios de la diapositiva de Beto Nuevo video con ajuste de Sergio
</commit_message>
<xml_diff>
--- a/documentacion/presentacion/Presentación.pptx
+++ b/documentacion/presentacion/Presentación.pptx
@@ -161,7 +161,7 @@
   </p:defaultTextStyle>
   <p:extLst>
     <p:ext uri="{EFAFB233-063F-42B5-8137-9DF3F51BA10A}">
-      <p15:sldGuideLst xmlns="" xmlns:p15="http://schemas.microsoft.com/office/powerpoint/2012/main">
+      <p15:sldGuideLst xmlns:p15="http://schemas.microsoft.com/office/powerpoint/2012/main" xmlns="">
         <p15:guide id="1" orient="horz" pos="2160">
           <p15:clr>
             <a:srgbClr val="A4A3A4"/>
@@ -180,7 +180,7 @@
       </p15:sldGuideLst>
     </p:ext>
     <p:ext uri="{2D200454-40CA-4A62-9FC3-DE9A4176ACB9}">
-      <p15:notesGuideLst xmlns="" xmlns:p15="http://schemas.microsoft.com/office/powerpoint/2012/main">
+      <p15:notesGuideLst xmlns:p15="http://schemas.microsoft.com/office/powerpoint/2012/main" xmlns="">
         <p15:guide id="1" orient="horz" pos="2880">
           <p15:clr>
             <a:srgbClr val="A4A3A4"/>
@@ -9798,8 +9798,8 @@
   </dgm:ptLst>
   <dgm:cxnLst>
     <dgm:cxn modelId="{F3B89C52-602F-49F7-B10E-F3B64BCDF706}" srcId="{758CBA3A-9936-4C67-965C-A8DD3074879B}" destId="{E90264E4-81CE-47E1-80E3-2624D8E5DFEE}" srcOrd="0" destOrd="0" parTransId="{79881485-DDC4-4A70-AA7E-393B9FD5747B}" sibTransId="{F41EE2E3-AB57-4E33-8FAD-2DCFFB467FDC}"/>
+    <dgm:cxn modelId="{71020D69-C5AD-43DE-B6F9-DE4B97903C05}" type="presOf" srcId="{E90264E4-81CE-47E1-80E3-2624D8E5DFEE}" destId="{86D241E9-42FA-45D1-B43B-0D95B75E0E69}" srcOrd="0" destOrd="0" presId="urn:microsoft.com/office/officeart/2005/8/layout/vList6"/>
     <dgm:cxn modelId="{7AF8155A-4660-4657-BECD-CE036826812D}" type="presOf" srcId="{758CBA3A-9936-4C67-965C-A8DD3074879B}" destId="{82B24097-E3F6-4B04-A03D-10817D4779A3}" srcOrd="0" destOrd="0" presId="urn:microsoft.com/office/officeart/2005/8/layout/vList6"/>
-    <dgm:cxn modelId="{71020D69-C5AD-43DE-B6F9-DE4B97903C05}" type="presOf" srcId="{E90264E4-81CE-47E1-80E3-2624D8E5DFEE}" destId="{86D241E9-42FA-45D1-B43B-0D95B75E0E69}" srcOrd="0" destOrd="0" presId="urn:microsoft.com/office/officeart/2005/8/layout/vList6"/>
     <dgm:cxn modelId="{9DCACF08-67E5-42E1-8E54-42CD4C27D07C}" type="presOf" srcId="{3183185A-2A53-4D8C-8F32-C845F2F70CBF}" destId="{C34369FE-6903-484E-A191-A351659EBD9E}" srcOrd="0" destOrd="0" presId="urn:microsoft.com/office/officeart/2005/8/layout/vList6"/>
     <dgm:cxn modelId="{F717B596-7122-4C3F-9238-14763508386B}" srcId="{3183185A-2A53-4D8C-8F32-C845F2F70CBF}" destId="{758CBA3A-9936-4C67-965C-A8DD3074879B}" srcOrd="0" destOrd="0" parTransId="{39812E31-9C15-4A6C-B8B9-78CE6FB555B1}" sibTransId="{290E9CBE-1634-47AD-B973-508944073D35}"/>
     <dgm:cxn modelId="{80780EE3-B5A3-4F4E-A58B-9684AA7BCA2C}" type="presParOf" srcId="{C34369FE-6903-484E-A191-A351659EBD9E}" destId="{EEE79D24-22DD-43C8-B2F2-0B4DC8DD6A80}" srcOrd="0" destOrd="0" presId="urn:microsoft.com/office/officeart/2005/8/layout/vList6"/>
@@ -23437,7 +23437,7 @@
           <a:p>
             <a:fld id="{BDB7646E-8811-423A-9C42-2CBFADA00A96}" type="datetimeFigureOut">
               <a:rPr lang="es-ES" smtClean="0"/>
-              <a:t>02/02/2015</a:t>
+              <a:t>05/02/2015</a:t>
             </a:fld>
             <a:endParaRPr lang="es-ES"/>
           </a:p>
@@ -23610,7 +23610,7 @@
           <a:p>
             <a:fld id="{D677E230-58DD-43ED-96A1-552DDAB53532}" type="datetimeFigureOut">
               <a:pPr/>
-              <a:t>30/01/2015</a:t>
+              <a:t>05/02/2015</a:t>
             </a:fld>
             <a:endParaRPr lang="es-ES"/>
           </a:p>
@@ -24208,9 +24208,19 @@
             </a:br>
             <a:r>
               <a:rPr lang="es-CR" dirty="0" smtClean="0"/>
-              <a:t>Esto es lo importante a destacar de la aplicación.</a:t>
-            </a:r>
-            <a:endParaRPr lang="es-CR" dirty="0"/>
+              <a:t>Esto es lo importante a destacar de la </a:t>
+            </a:r>
+            <a:r>
+              <a:rPr lang="es-CR" dirty="0" smtClean="0"/>
+              <a:t>aplicación.</a:t>
+            </a:r>
+          </a:p>
+          <a:p>
+            <a:endParaRPr lang="es-CR" dirty="0">
+              <a:solidFill>
+                <a:srgbClr val="FFC000"/>
+              </a:solidFill>
+            </a:endParaRPr>
           </a:p>
         </p:txBody>
       </p:sp>
@@ -25386,8 +25396,11 @@
                 <a:ea typeface="+mn-ea"/>
                 <a:cs typeface="+mn-cs"/>
               </a:rPr>
-              <a:t>, permite obtener estadísticas relevantes acerca del estado de los sistemas operativos móviles en el país</a:t>
-            </a:r>
+              <a:t>, permite obtener estadísticas relevantes acerca del estado de los sistemas operativos móviles en el país.</a:t>
+            </a:r>
+          </a:p>
+          <a:p>
+            <a:pPr lvl="0"/>
             <a:r>
               <a:rPr lang="es-CR" sz="1200" kern="1200" dirty="0" smtClean="0">
                 <a:solidFill>
@@ -25398,34 +25411,7 @@
                 <a:ea typeface="+mn-ea"/>
                 <a:cs typeface="+mn-cs"/>
               </a:rPr>
-              <a:t>.</a:t>
-            </a:r>
-          </a:p>
-          <a:p>
-            <a:pPr lvl="0"/>
-            <a:r>
-              <a:rPr lang="es-CR" sz="1200" kern="1200" dirty="0" smtClean="0">
-                <a:solidFill>
-                  <a:schemeClr val="tx2"/>
-                </a:solidFill>
-                <a:effectLst/>
-                <a:latin typeface="+mn-lt"/>
-                <a:ea typeface="+mn-ea"/>
-                <a:cs typeface="+mn-cs"/>
-              </a:rPr>
-              <a:t> </a:t>
-            </a:r>
-            <a:r>
-              <a:rPr lang="es-CR" sz="1200" kern="1200" dirty="0" smtClean="0">
-                <a:solidFill>
-                  <a:schemeClr val="tx2"/>
-                </a:solidFill>
-                <a:effectLst/>
-                <a:latin typeface="+mn-lt"/>
-                <a:ea typeface="+mn-ea"/>
-                <a:cs typeface="+mn-cs"/>
-              </a:rPr>
-              <a:t>El siguiente gráfico agrupa información desde</a:t>
+              <a:t> El siguiente gráfico agrupa información desde</a:t>
             </a:r>
             <a:r>
               <a:rPr lang="es-CR" sz="1200" kern="1200" baseline="0" dirty="0" smtClean="0">
@@ -26532,7 +26518,31 @@
                 <a:ea typeface="+mn-ea"/>
                 <a:cs typeface="+mn-cs"/>
               </a:rPr>
-              <a:t>3, 4 tonos (XQ???) la lógica del examen se basa en lo indicado</a:t>
+              <a:t>3, 4 </a:t>
+            </a:r>
+            <a:r>
+              <a:rPr lang="es-CR" sz="1200" kern="1200" dirty="0" smtClean="0">
+                <a:solidFill>
+                  <a:schemeClr val="tx2"/>
+                </a:solidFill>
+                <a:effectLst/>
+                <a:latin typeface="+mn-lt"/>
+                <a:ea typeface="+mn-ea"/>
+                <a:cs typeface="+mn-cs"/>
+              </a:rPr>
+              <a:t>tonos </a:t>
+            </a:r>
+            <a:r>
+              <a:rPr lang="es-CR" sz="1200" kern="1200" dirty="0" smtClean="0">
+                <a:solidFill>
+                  <a:schemeClr val="tx2"/>
+                </a:solidFill>
+                <a:effectLst/>
+                <a:latin typeface="+mn-lt"/>
+                <a:ea typeface="+mn-ea"/>
+                <a:cs typeface="+mn-cs"/>
+              </a:rPr>
+              <a:t>la lógica del examen se basa en lo indicado</a:t>
             </a:r>
             <a:r>
               <a:rPr lang="es-CR" sz="1200" kern="1200" baseline="0" dirty="0" smtClean="0">
@@ -30792,11 +30802,7 @@
             </a:br>
             <a:r>
               <a:rPr lang="es-CR" dirty="0" smtClean="0"/>
-              <a:t>1, </a:t>
-            </a:r>
-            <a:r>
-              <a:rPr lang="es-CR" dirty="0" smtClean="0"/>
-              <a:t>costo de</a:t>
+              <a:t>1, costo de</a:t>
             </a:r>
             <a:r>
               <a:rPr lang="es-CR" baseline="0" dirty="0" smtClean="0"/>
@@ -31646,37 +31652,15 @@
           <a:p>
             <a:r>
               <a:rPr lang="en-US" dirty="0" err="1" smtClean="0"/>
-              <a:t>Ver</a:t>
-            </a:r>
-            <a:r>
-              <a:rPr lang="en-US" dirty="0" smtClean="0"/>
+              <a:t>Enero</a:t>
+            </a:r>
+            <a:r>
+              <a:rPr lang="en-US" baseline="0" dirty="0" smtClean="0"/>
               <a:t> </a:t>
             </a:r>
             <a:r>
-              <a:rPr lang="en-US" dirty="0" err="1" smtClean="0"/>
-              <a:t>resaltes</a:t>
-            </a:r>
-            <a:r>
-              <a:rPr lang="en-US" dirty="0" smtClean="0"/>
-              <a:t> en </a:t>
-            </a:r>
-            <a:r>
-              <a:rPr lang="en-US" dirty="0" err="1" smtClean="0"/>
-              <a:t>negrita</a:t>
-            </a:r>
-            <a:endParaRPr lang="en-US" dirty="0" smtClean="0"/>
-          </a:p>
-          <a:p>
-            <a:endParaRPr lang="en-US" dirty="0" smtClean="0"/>
-          </a:p>
-          <a:p>
-            <a:r>
-              <a:rPr lang="en-US" dirty="0" err="1" smtClean="0"/>
-              <a:t>Enero</a:t>
-            </a:r>
-            <a:r>
               <a:rPr lang="en-US" baseline="0" dirty="0" smtClean="0"/>
-              <a:t> 2010</a:t>
+              <a:t>2010</a:t>
             </a:r>
           </a:p>
           <a:p>
@@ -31689,13 +31673,303 @@
             </a:r>
             <a:r>
               <a:rPr lang="en-US" baseline="0" dirty="0" smtClean="0"/>
-              <a:t> SOLUCIONES ALTA TECNOLOGIA, PROGRAMAS DECONSERVACION AUDITIVA</a:t>
+              <a:t> SOLUCIONES ALTA TECNOLOGIA, PROGRAMAS </a:t>
+            </a:r>
+            <a:r>
+              <a:rPr lang="en-US" baseline="0" dirty="0" smtClean="0"/>
+              <a:t>DE CONSERVACION </a:t>
+            </a:r>
+            <a:r>
+              <a:rPr lang="en-US" baseline="0" dirty="0" smtClean="0"/>
+              <a:t>AUDITIVA</a:t>
             </a:r>
           </a:p>
           <a:p>
             <a:r>
               <a:rPr lang="en-US" baseline="0" dirty="0" smtClean="0"/>
-              <a:t>Vision LIDER PREVENCION EDUCACION, DETECCION,HABILITACION, REHABILITACION</a:t>
+              <a:t>Vision LIDER PREVENCION EDUCACION, DETECCION,HABILITACION, </a:t>
+            </a:r>
+            <a:r>
+              <a:rPr lang="en-US" baseline="0" dirty="0" smtClean="0"/>
+              <a:t>REHABILITACION</a:t>
+            </a:r>
+            <a:br>
+              <a:rPr lang="en-US" baseline="0" dirty="0" smtClean="0"/>
+            </a:br>
+            <a:endParaRPr lang="en-US" baseline="0" dirty="0" smtClean="0"/>
+          </a:p>
+          <a:p>
+            <a:r>
+              <a:rPr lang="en-US" baseline="0" dirty="0" smtClean="0"/>
+              <a:t>OPCIONAL</a:t>
+            </a:r>
+            <a:br>
+              <a:rPr lang="en-US" baseline="0" dirty="0" smtClean="0"/>
+            </a:br>
+            <a:r>
+              <a:rPr lang="en-US" baseline="0" dirty="0" err="1" smtClean="0"/>
+              <a:t>Productos</a:t>
+            </a:r>
+            <a:r>
+              <a:rPr lang="en-US" baseline="0" dirty="0" smtClean="0"/>
+              <a:t> </a:t>
+            </a:r>
+            <a:r>
+              <a:rPr lang="en-US" baseline="0" dirty="0" err="1" smtClean="0"/>
+              <a:t>ofrecidos</a:t>
+            </a:r>
+            <a:endParaRPr lang="en-US" baseline="0" dirty="0" smtClean="0"/>
+          </a:p>
+          <a:p>
+            <a:r>
+              <a:rPr lang="es-CR" sz="1200" b="0" i="0" kern="1200" dirty="0" smtClean="0">
+                <a:solidFill>
+                  <a:schemeClr val="tx2"/>
+                </a:solidFill>
+                <a:effectLst/>
+                <a:latin typeface="+mn-lt"/>
+                <a:ea typeface="+mn-ea"/>
+                <a:cs typeface="+mn-cs"/>
+              </a:rPr>
+              <a:t>Audífonos 100% digitales</a:t>
+            </a:r>
+            <a:r>
+              <a:rPr lang="es-CR" dirty="0" smtClean="0"/>
+              <a:t/>
+            </a:r>
+            <a:br>
+              <a:rPr lang="es-CR" dirty="0" smtClean="0"/>
+            </a:br>
+            <a:r>
+              <a:rPr lang="es-CR" sz="1200" b="0" i="0" kern="1200" dirty="0" smtClean="0">
+                <a:solidFill>
+                  <a:schemeClr val="tx2"/>
+                </a:solidFill>
+                <a:effectLst/>
+                <a:latin typeface="+mn-lt"/>
+                <a:ea typeface="+mn-ea"/>
+                <a:cs typeface="+mn-cs"/>
+              </a:rPr>
+              <a:t>Audiometrías</a:t>
+            </a:r>
+            <a:r>
+              <a:rPr lang="es-CR" dirty="0" smtClean="0"/>
+              <a:t/>
+            </a:r>
+            <a:br>
+              <a:rPr lang="es-CR" dirty="0" smtClean="0"/>
+            </a:br>
+            <a:r>
+              <a:rPr lang="es-CR" sz="1200" b="0" i="0" kern="1200" dirty="0" smtClean="0">
+                <a:solidFill>
+                  <a:schemeClr val="tx2"/>
+                </a:solidFill>
+                <a:effectLst/>
+                <a:latin typeface="+mn-lt"/>
+                <a:ea typeface="+mn-ea"/>
+                <a:cs typeface="+mn-cs"/>
+              </a:rPr>
+              <a:t>Protectores de ruidos</a:t>
+            </a:r>
+            <a:r>
+              <a:rPr lang="es-CR" sz="1200" b="0" i="0" kern="1200" baseline="0" dirty="0" smtClean="0">
+                <a:solidFill>
+                  <a:schemeClr val="tx2"/>
+                </a:solidFill>
+                <a:effectLst/>
+                <a:latin typeface="+mn-lt"/>
+                <a:ea typeface="+mn-ea"/>
+                <a:cs typeface="+mn-cs"/>
+              </a:rPr>
+              <a:t> </a:t>
+            </a:r>
+          </a:p>
+          <a:p>
+            <a:r>
+              <a:rPr lang="es-CR" sz="1200" b="0" i="0" kern="1200" dirty="0" smtClean="0">
+                <a:solidFill>
+                  <a:schemeClr val="tx2"/>
+                </a:solidFill>
+                <a:effectLst/>
+                <a:latin typeface="+mn-lt"/>
+                <a:ea typeface="+mn-ea"/>
+                <a:cs typeface="+mn-cs"/>
+              </a:rPr>
+              <a:t/>
+            </a:r>
+            <a:br>
+              <a:rPr lang="es-CR" sz="1200" b="0" i="0" kern="1200" dirty="0" smtClean="0">
+                <a:solidFill>
+                  <a:schemeClr val="tx2"/>
+                </a:solidFill>
+                <a:effectLst/>
+                <a:latin typeface="+mn-lt"/>
+                <a:ea typeface="+mn-ea"/>
+                <a:cs typeface="+mn-cs"/>
+              </a:rPr>
+            </a:br>
+            <a:r>
+              <a:rPr lang="es-CR" sz="1200" b="0" i="0" kern="1200" dirty="0" smtClean="0">
+                <a:solidFill>
+                  <a:schemeClr val="tx2"/>
+                </a:solidFill>
+                <a:effectLst/>
+                <a:latin typeface="+mn-lt"/>
+                <a:ea typeface="+mn-ea"/>
+                <a:cs typeface="+mn-cs"/>
+              </a:rPr>
+              <a:t>Equipo Audiológico:</a:t>
+            </a:r>
+            <a:br>
+              <a:rPr lang="es-CR" sz="1200" b="0" i="0" kern="1200" dirty="0" smtClean="0">
+                <a:solidFill>
+                  <a:schemeClr val="tx2"/>
+                </a:solidFill>
+                <a:effectLst/>
+                <a:latin typeface="+mn-lt"/>
+                <a:ea typeface="+mn-ea"/>
+                <a:cs typeface="+mn-cs"/>
+              </a:rPr>
+            </a:br>
+            <a:r>
+              <a:rPr lang="es-CR" sz="1200" b="0" i="0" kern="1200" dirty="0" smtClean="0">
+                <a:solidFill>
+                  <a:schemeClr val="tx2"/>
+                </a:solidFill>
+                <a:effectLst/>
+                <a:latin typeface="+mn-lt"/>
+                <a:ea typeface="+mn-ea"/>
+                <a:cs typeface="+mn-cs"/>
+              </a:rPr>
+              <a:t>Audiómetros</a:t>
+            </a:r>
+            <a:br>
+              <a:rPr lang="es-CR" sz="1200" b="0" i="0" kern="1200" dirty="0" smtClean="0">
+                <a:solidFill>
+                  <a:schemeClr val="tx2"/>
+                </a:solidFill>
+                <a:effectLst/>
+                <a:latin typeface="+mn-lt"/>
+                <a:ea typeface="+mn-ea"/>
+                <a:cs typeface="+mn-cs"/>
+              </a:rPr>
+            </a:br>
+            <a:r>
+              <a:rPr lang="es-CR" sz="1200" b="0" i="0" kern="1200" dirty="0" err="1" smtClean="0">
+                <a:solidFill>
+                  <a:schemeClr val="tx2"/>
+                </a:solidFill>
+                <a:effectLst/>
+                <a:latin typeface="+mn-lt"/>
+                <a:ea typeface="+mn-ea"/>
+                <a:cs typeface="+mn-cs"/>
+              </a:rPr>
+              <a:t>Impedanciómetros</a:t>
+            </a:r>
+            <a:r>
+              <a:rPr lang="es-CR" sz="1200" b="0" i="0" kern="1200" dirty="0" smtClean="0">
+                <a:solidFill>
+                  <a:schemeClr val="tx2"/>
+                </a:solidFill>
+                <a:effectLst/>
+                <a:latin typeface="+mn-lt"/>
+                <a:ea typeface="+mn-ea"/>
+                <a:cs typeface="+mn-cs"/>
+              </a:rPr>
+              <a:t/>
+            </a:r>
+            <a:br>
+              <a:rPr lang="es-CR" sz="1200" b="0" i="0" kern="1200" dirty="0" smtClean="0">
+                <a:solidFill>
+                  <a:schemeClr val="tx2"/>
+                </a:solidFill>
+                <a:effectLst/>
+                <a:latin typeface="+mn-lt"/>
+                <a:ea typeface="+mn-ea"/>
+                <a:cs typeface="+mn-cs"/>
+              </a:rPr>
+            </a:br>
+            <a:r>
+              <a:rPr lang="es-CR" sz="1200" b="0" i="0" kern="1200" dirty="0" smtClean="0">
+                <a:solidFill>
+                  <a:schemeClr val="tx2"/>
+                </a:solidFill>
+                <a:effectLst/>
+                <a:latin typeface="+mn-lt"/>
+                <a:ea typeface="+mn-ea"/>
+                <a:cs typeface="+mn-cs"/>
+              </a:rPr>
+              <a:t>Emisiones </a:t>
+            </a:r>
+            <a:r>
+              <a:rPr lang="es-CR" sz="1200" b="0" i="0" kern="1200" dirty="0" err="1" smtClean="0">
+                <a:solidFill>
+                  <a:schemeClr val="tx2"/>
+                </a:solidFill>
+                <a:effectLst/>
+                <a:latin typeface="+mn-lt"/>
+                <a:ea typeface="+mn-ea"/>
+                <a:cs typeface="+mn-cs"/>
+              </a:rPr>
+              <a:t>Otoacústicas</a:t>
+            </a:r>
+            <a:r>
+              <a:rPr lang="es-CR" sz="1200" b="0" i="0" kern="1200" dirty="0" smtClean="0">
+                <a:solidFill>
+                  <a:schemeClr val="tx2"/>
+                </a:solidFill>
+                <a:effectLst/>
+                <a:latin typeface="+mn-lt"/>
+                <a:ea typeface="+mn-ea"/>
+                <a:cs typeface="+mn-cs"/>
+              </a:rPr>
+              <a:t/>
+            </a:r>
+            <a:br>
+              <a:rPr lang="es-CR" sz="1200" b="0" i="0" kern="1200" dirty="0" smtClean="0">
+                <a:solidFill>
+                  <a:schemeClr val="tx2"/>
+                </a:solidFill>
+                <a:effectLst/>
+                <a:latin typeface="+mn-lt"/>
+                <a:ea typeface="+mn-ea"/>
+                <a:cs typeface="+mn-cs"/>
+              </a:rPr>
+            </a:br>
+            <a:r>
+              <a:rPr lang="es-CR" sz="1200" b="0" i="0" kern="1200" dirty="0" smtClean="0">
+                <a:solidFill>
+                  <a:schemeClr val="tx2"/>
+                </a:solidFill>
+                <a:effectLst/>
+                <a:latin typeface="+mn-lt"/>
+                <a:ea typeface="+mn-ea"/>
+                <a:cs typeface="+mn-cs"/>
+              </a:rPr>
+              <a:t>Sonómetros</a:t>
+            </a:r>
+            <a:br>
+              <a:rPr lang="es-CR" sz="1200" b="0" i="0" kern="1200" dirty="0" smtClean="0">
+                <a:solidFill>
+                  <a:schemeClr val="tx2"/>
+                </a:solidFill>
+                <a:effectLst/>
+                <a:latin typeface="+mn-lt"/>
+                <a:ea typeface="+mn-ea"/>
+                <a:cs typeface="+mn-cs"/>
+              </a:rPr>
+            </a:br>
+            <a:r>
+              <a:rPr lang="es-CR" sz="1200" b="0" i="0" kern="1200" dirty="0" err="1" smtClean="0">
+                <a:solidFill>
+                  <a:schemeClr val="tx2"/>
+                </a:solidFill>
+                <a:effectLst/>
+                <a:latin typeface="+mn-lt"/>
+                <a:ea typeface="+mn-ea"/>
+                <a:cs typeface="+mn-cs"/>
+              </a:rPr>
+              <a:t>Audiodosímetros</a:t>
             </a:r>
             <a:endParaRPr lang="es-CR" dirty="0"/>
           </a:p>
@@ -31807,11 +32081,7 @@
             </a:r>
             <a:r>
               <a:rPr lang="es-CR" dirty="0" smtClean="0"/>
-              <a:t> </a:t>
-            </a:r>
-            <a:r>
-              <a:rPr lang="es-CR" dirty="0" smtClean="0"/>
-              <a:t>2013</a:t>
+              <a:t> 2013</a:t>
             </a:r>
           </a:p>
           <a:p>
@@ -31819,12 +32089,12 @@
           </a:p>
           <a:p>
             <a:r>
-              <a:rPr lang="es-CR" dirty="0" err="1" smtClean="0"/>
-              <a:t>Ministeriode</a:t>
-            </a:r>
-            <a:r>
               <a:rPr lang="es-CR" dirty="0" smtClean="0"/>
-              <a:t> Industria</a:t>
+              <a:t>Ministerio de </a:t>
+            </a:r>
+            <a:r>
+              <a:rPr lang="es-CR" dirty="0" smtClean="0"/>
+              <a:t>Industria</a:t>
             </a:r>
             <a:r>
               <a:rPr lang="es-CR" baseline="0" dirty="0" smtClean="0"/>
@@ -31837,7 +32107,28 @@
           <a:p>
             <a:r>
               <a:rPr lang="es-CR" baseline="0" dirty="0" smtClean="0"/>
-              <a:t>Empresas destacadas anualmente</a:t>
+              <a:t>Empresas destacadas </a:t>
+            </a:r>
+            <a:r>
+              <a:rPr lang="es-CR" baseline="0" dirty="0" smtClean="0"/>
+              <a:t>anualmente</a:t>
+            </a:r>
+          </a:p>
+          <a:p>
+            <a:endParaRPr lang="en-US" baseline="0" dirty="0" smtClean="0"/>
+          </a:p>
+          <a:p>
+            <a:r>
+              <a:rPr lang="es-CR" sz="1200" b="0" i="0" kern="1200" dirty="0" smtClean="0">
+                <a:solidFill>
+                  <a:schemeClr val="tx2"/>
+                </a:solidFill>
+                <a:effectLst/>
+                <a:latin typeface="+mn-lt"/>
+                <a:ea typeface="+mn-ea"/>
+                <a:cs typeface="+mn-cs"/>
+              </a:rPr>
+              <a:t>Pyme verde, joven, proveedora del estado, mujer, exportadora e innovadora</a:t>
             </a:r>
             <a:endParaRPr lang="es-CR" dirty="0"/>
           </a:p>
@@ -32975,7 +33266,7 @@
           <a:p>
             <a:fld id="{C2C6F8EA-316C-41DE-B9A4-EDCC3A85ED9A}" type="datetimeFigureOut">
               <a:pPr/>
-              <a:t>30/01/2015</a:t>
+              <a:t>05/02/2015</a:t>
             </a:fld>
             <a:endParaRPr lang="es-ES"/>
           </a:p>
@@ -33230,7 +33521,7 @@
           <a:lstStyle/>
           <a:p>
             <a:fld id="{C2C6F8EA-316C-41DE-B9A4-EDCC3A85ED9A}" type="datetimeFigureOut">
-              <a:t>30/01/2015</a:t>
+              <a:t>05/02/2015</a:t>
             </a:fld>
             <a:endParaRPr lang="es-ES"/>
           </a:p>
@@ -33723,7 +34014,7 @@
           <a:lstStyle/>
           <a:p>
             <a:fld id="{C2C6F8EA-316C-41DE-B9A4-EDCC3A85ED9A}" type="datetimeFigureOut">
-              <a:t>30/01/2015</a:t>
+              <a:t>05/02/2015</a:t>
             </a:fld>
             <a:endParaRPr lang="es-ES"/>
           </a:p>
@@ -33954,7 +34245,7 @@
           <a:lstStyle/>
           <a:p>
             <a:fld id="{C2C6F8EA-316C-41DE-B9A4-EDCC3A85ED9A}" type="datetimeFigureOut">
-              <a:t>30/01/2015</a:t>
+              <a:t>05/02/2015</a:t>
             </a:fld>
             <a:endParaRPr lang="es-ES"/>
           </a:p>
@@ -34747,7 +35038,7 @@
           <a:p>
             <a:fld id="{C2C6F8EA-316C-41DE-B9A4-EDCC3A85ED9A}" type="datetimeFigureOut">
               <a:pPr/>
-              <a:t>30/01/2015</a:t>
+              <a:t>05/02/2015</a:t>
             </a:fld>
             <a:endParaRPr lang="es-ES"/>
           </a:p>
@@ -35251,7 +35542,7 @@
           <a:lstStyle/>
           <a:p>
             <a:fld id="{C2C6F8EA-316C-41DE-B9A4-EDCC3A85ED9A}" type="datetimeFigureOut">
-              <a:t>30/01/2015</a:t>
+              <a:t>05/02/2015</a:t>
             </a:fld>
             <a:endParaRPr lang="es-ES"/>
           </a:p>
@@ -35701,7 +35992,7 @@
           <a:lstStyle/>
           <a:p>
             <a:fld id="{C2C6F8EA-316C-41DE-B9A4-EDCC3A85ED9A}" type="datetimeFigureOut">
-              <a:t>30/01/2015</a:t>
+              <a:t>05/02/2015</a:t>
             </a:fld>
             <a:endParaRPr lang="es-ES"/>
           </a:p>
@@ -35835,7 +36126,7 @@
           <a:lstStyle/>
           <a:p>
             <a:fld id="{C2C6F8EA-316C-41DE-B9A4-EDCC3A85ED9A}" type="datetimeFigureOut">
-              <a:t>30/01/2015</a:t>
+              <a:t>05/02/2015</a:t>
             </a:fld>
             <a:endParaRPr lang="es-ES"/>
           </a:p>
@@ -36175,7 +36466,7 @@
           <a:lstStyle/>
           <a:p>
             <a:fld id="{C2C6F8EA-316C-41DE-B9A4-EDCC3A85ED9A}" type="datetimeFigureOut">
-              <a:t>30/01/2015</a:t>
+              <a:t>05/02/2015</a:t>
             </a:fld>
             <a:endParaRPr lang="es-ES"/>
           </a:p>
@@ -36670,7 +36961,7 @@
           <a:lstStyle/>
           <a:p>
             <a:fld id="{C2C6F8EA-316C-41DE-B9A4-EDCC3A85ED9A}" type="datetimeFigureOut">
-              <a:t>30/01/2015</a:t>
+              <a:t>05/02/2015</a:t>
             </a:fld>
             <a:endParaRPr lang="es-ES"/>
           </a:p>
@@ -37109,7 +37400,7 @@
           <a:lstStyle/>
           <a:p>
             <a:fld id="{C2C6F8EA-316C-41DE-B9A4-EDCC3A85ED9A}" type="datetimeFigureOut">
-              <a:t>30/01/2015</a:t>
+              <a:t>05/02/2015</a:t>
             </a:fld>
             <a:endParaRPr lang="es-ES"/>
           </a:p>
@@ -37672,7 +37963,7 @@
           <a:p>
             <a:fld id="{C2C6F8EA-316C-41DE-B9A4-EDCC3A85ED9A}" type="datetimeFigureOut">
               <a:pPr/>
-              <a:t>30/01/2015</a:t>
+              <a:t>05/02/2015</a:t>
             </a:fld>
             <a:endParaRPr lang="es-ES"/>
           </a:p>
@@ -38112,7 +38403,7 @@
   </p:txStyles>
   <p:extLst mod="1">
     <p:ext uri="{27BBF7A9-308A-43DC-89C8-2F10F3537804}">
-      <p15:sldGuideLst xmlns="" xmlns:p15="http://schemas.microsoft.com/office/powerpoint/2012/main">
+      <p15:sldGuideLst xmlns:p15="http://schemas.microsoft.com/office/powerpoint/2012/main" xmlns="">
         <p15:guide id="1" orient="horz" pos="2160" userDrawn="1">
           <p15:clr>
             <a:srgbClr val="F26B43"/>
@@ -44131,7 +44422,19 @@
             </a:r>
             <a:r>
               <a:rPr lang="es-CR" sz="2000" dirty="0"/>
-              <a:t>de una aplicación que cumple con los requerimientos establecidos, siendo esta la herramienta de tecnología móvil </a:t>
+              <a:t>de una aplicación que cumple con los requerimientos establecidos, siendo </a:t>
+            </a:r>
+            <a:r>
+              <a:rPr lang="es-CR" sz="2000" dirty="0"/>
+              <a:t>é</a:t>
+            </a:r>
+            <a:r>
+              <a:rPr lang="es-CR" sz="2000" dirty="0" smtClean="0"/>
+              <a:t>sta </a:t>
+            </a:r>
+            <a:r>
+              <a:rPr lang="es-CR" sz="2000" dirty="0"/>
+              <a:t>la herramienta de tecnología móvil </a:t>
             </a:r>
             <a:r>
               <a:rPr lang="es-CR" sz="2000" dirty="0" smtClean="0"/>
@@ -50022,11 +50325,7 @@
           <a:p>
             <a:r>
               <a:rPr lang="es-ES" dirty="0" smtClean="0"/>
-              <a:t>Clínica </a:t>
-            </a:r>
-            <a:r>
-              <a:rPr lang="es-ES" dirty="0" smtClean="0"/>
-              <a:t>Audinsa S.A.</a:t>
+              <a:t>Clínica Audinsa S.A.</a:t>
             </a:r>
             <a:endParaRPr lang="es-ES" dirty="0"/>
           </a:p>
@@ -50235,11 +50534,7 @@
           <a:p>
             <a:r>
               <a:rPr lang="es-ES" dirty="0" smtClean="0"/>
-              <a:t>Clínica </a:t>
-            </a:r>
-            <a:r>
-              <a:rPr lang="es-ES" dirty="0" smtClean="0"/>
-              <a:t>Audinsa S.A.</a:t>
+              <a:t>Clínica Audinsa S.A.</a:t>
             </a:r>
             <a:endParaRPr lang="es-ES" dirty="0"/>
           </a:p>
@@ -51728,6 +52023,21 @@
 </file>
 
 <file path=customXml/item1.xml><?xml version="1.0" encoding="utf-8"?>
+<p:properties xmlns:p="http://schemas.microsoft.com/office/2006/metadata/properties" xmlns:xsi="http://www.w3.org/2001/XMLSchema-instance" xmlns:pc="http://schemas.microsoft.com/office/infopath/2007/PartnerControls">
+  <documentManagement/>
+</p:properties>
+</file>
+
+<file path=customXml/item2.xml><?xml version="1.0" encoding="utf-8"?>
+<?mso-contentType ?>
+<FormTemplates xmlns="http://schemas.microsoft.com/sharepoint/v3/contenttype/forms">
+  <Display>DocumentoBibliotecaFormulario</Display>
+  <Edit>DocumentoBibliotecaFormulario</Edit>
+  <New>DocumentoBibliotecaFormulario</New>
+</FormTemplates>
+</file>
+
+<file path=customXml/item3.xml><?xml version="1.0" encoding="utf-8"?>
 <ct:contentTypeSchema xmlns:ct="http://schemas.microsoft.com/office/2006/metadata/contentType" xmlns:ma="http://schemas.microsoft.com/office/2006/metadata/properties/metaAttributes" ct:_="" ma:_="" ma:contentTypeName="Document" ma:contentTypeID="0x0101007C1D5F340F01F94FA2FD29A5E6DC872E" ma:contentTypeVersion="0" ma:contentTypeDescription="Create a new document." ma:contentTypeScope="" ma:versionID="f583bd66513a361a730282b6a794e352">
   <xsd:schema xmlns:xsd="http://www.w3.org/2001/XMLSchema" xmlns:xs="http://www.w3.org/2001/XMLSchema" xmlns:p="http://schemas.microsoft.com/office/2006/metadata/properties" targetNamespace="http://schemas.microsoft.com/office/2006/metadata/properties" ma:root="true" ma:fieldsID="6841151cf538834e171094e4faaf2d73">
     <xsd:element name="properties">
@@ -51841,38 +52151,7 @@
 </ct:contentTypeSchema>
 </file>
 
-<file path=customXml/item2.xml><?xml version="1.0" encoding="utf-8"?>
-<p:properties xmlns:p="http://schemas.microsoft.com/office/2006/metadata/properties" xmlns:xsi="http://www.w3.org/2001/XMLSchema-instance" xmlns:pc="http://schemas.microsoft.com/office/infopath/2007/PartnerControls">
-  <documentManagement/>
-</p:properties>
-</file>
-
-<file path=customXml/item3.xml><?xml version="1.0" encoding="utf-8"?>
-<?mso-contentType ?>
-<FormTemplates xmlns="http://schemas.microsoft.com/sharepoint/v3/contenttype/forms">
-  <Display>DocumentoBibliotecaFormulario</Display>
-  <Edit>DocumentoBibliotecaFormulario</Edit>
-  <New>DocumentoBibliotecaFormulario</New>
-</FormTemplates>
-</file>
-
 <file path=customXml/itemProps1.xml><?xml version="1.0" encoding="utf-8"?>
-<ds:datastoreItem xmlns:ds="http://schemas.openxmlformats.org/officeDocument/2006/customXml" ds:itemID="{F28882EF-8483-452E-ADFB-02067D56F72B}">
-  <ds:schemaRefs>
-    <ds:schemaRef ds:uri="http://schemas.microsoft.com/office/2006/metadata/contentType"/>
-    <ds:schemaRef ds:uri="http://schemas.microsoft.com/office/2006/metadata/properties/metaAttributes"/>
-    <ds:schemaRef ds:uri="http://www.w3.org/2001/XMLSchema"/>
-    <ds:schemaRef ds:uri="http://schemas.microsoft.com/office/2006/metadata/properties"/>
-    <ds:schemaRef ds:uri="http://schemas.openxmlformats.org/package/2006/metadata/core-properties"/>
-    <ds:schemaRef ds:uri="http://purl.org/dc/elements/1.1/"/>
-    <ds:schemaRef ds:uri="http://purl.org/dc/terms/"/>
-    <ds:schemaRef ds:uri="http://schemas.microsoft.com/internal/obd"/>
-    <ds:schemaRef ds:uri="http://schemas.microsoft.com/office/infopath/2007/PartnerControls"/>
-  </ds:schemaRefs>
-</ds:datastoreItem>
-</file>
-
-<file path=customXml/itemProps2.xml><?xml version="1.0" encoding="utf-8"?>
 <ds:datastoreItem xmlns:ds="http://schemas.openxmlformats.org/officeDocument/2006/customXml" ds:itemID="{20B895F5-7F43-4073-919C-BA6E32AC0200}">
   <ds:schemaRefs>
     <ds:schemaRef ds:uri="http://purl.org/dc/elements/1.1/"/>
@@ -51887,10 +52166,26 @@
 </ds:datastoreItem>
 </file>
 
-<file path=customXml/itemProps3.xml><?xml version="1.0" encoding="utf-8"?>
+<file path=customXml/itemProps2.xml><?xml version="1.0" encoding="utf-8"?>
 <ds:datastoreItem xmlns:ds="http://schemas.openxmlformats.org/officeDocument/2006/customXml" ds:itemID="{9763940C-480C-4D93-B5B4-BAA891CEADDB}">
   <ds:schemaRefs>
     <ds:schemaRef ds:uri="http://schemas.microsoft.com/sharepoint/v3/contenttype/forms"/>
   </ds:schemaRefs>
 </ds:datastoreItem>
+</file>
+
+<file path=customXml/itemProps3.xml><?xml version="1.0" encoding="utf-8"?>
+<ds:datastoreItem xmlns:ds="http://schemas.openxmlformats.org/officeDocument/2006/customXml" ds:itemID="{F28882EF-8483-452E-ADFB-02067D56F72B}">
+  <ds:schemaRefs>
+    <ds:schemaRef ds:uri="http://schemas.microsoft.com/office/2006/metadata/contentType"/>
+    <ds:schemaRef ds:uri="http://schemas.microsoft.com/office/2006/metadata/properties/metaAttributes"/>
+    <ds:schemaRef ds:uri="http://www.w3.org/2001/XMLSchema"/>
+    <ds:schemaRef ds:uri="http://schemas.microsoft.com/office/2006/metadata/properties"/>
+    <ds:schemaRef ds:uri="http://schemas.openxmlformats.org/package/2006/metadata/core-properties"/>
+    <ds:schemaRef ds:uri="http://purl.org/dc/elements/1.1/"/>
+    <ds:schemaRef ds:uri="http://purl.org/dc/terms/"/>
+    <ds:schemaRef ds:uri="http://schemas.microsoft.com/internal/obd"/>
+    <ds:schemaRef ds:uri="http://schemas.microsoft.com/office/infopath/2007/PartnerControls"/>
+  </ds:schemaRefs>
+</ds:datastoreItem>
 </file>
</xml_diff>